<commit_message>
Updated Microsoft logo, speaker name placeholders
</commit_message>
<xml_diff>
--- a/BuildingDeployingMVC4.pptx
+++ b/BuildingDeployingMVC4.pptx
@@ -500,7 +500,7 @@
               <a:rPr lang="en-US" smtClean="0">
                 <a:latin typeface="Segoe UI" pitchFamily="34" charset="0"/>
               </a:rPr>
-              <a:t>11/30/2012</a:t>
+              <a:t>12/20/2012</a:t>
             </a:fld>
             <a:endParaRPr lang="en-US" dirty="0">
               <a:latin typeface="Segoe UI" pitchFamily="34" charset="0"/>
@@ -682,7 +682,7 @@
             <a:fld id="{CAE3F082-F902-42D8-A765-720E172C3194}" type="datetimeFigureOut">
               <a:rPr lang="en-US" smtClean="0"/>
               <a:pPr/>
-              <a:t>11/30/2012</a:t>
+              <a:t>12/20/2012</a:t>
             </a:fld>
             <a:endParaRPr lang="en-US" dirty="0"/>
           </a:p>
@@ -1003,7 +1003,6 @@
               <a:rPr lang="en-US" baseline="0" dirty="0" smtClean="0"/>
               <a:t>Main thing from this slide: MVC builds on the same ASP.NET core as ASP.NET Web Forms, Web Pages, etc.</a:t>
             </a:r>
-            <a:endParaRPr lang="en-US" baseline="0" dirty="0" smtClean="0"/>
           </a:p>
         </p:txBody>
       </p:sp>
@@ -1507,11 +1506,7 @@
             </a:r>
             <a:r>
               <a:rPr lang="en-US" baseline="0" dirty="0" smtClean="0"/>
-              <a:t> </a:t>
-            </a:r>
-            <a:r>
-              <a:rPr lang="en-US" baseline="0" dirty="0" smtClean="0"/>
-              <a:t>property</a:t>
+              <a:t> property</a:t>
             </a:r>
           </a:p>
           <a:p>
@@ -4390,40 +4385,6 @@
           <a:chExt cx="0" cy="0"/>
         </a:xfrm>
       </p:grpSpPr>
-      <p:pic>
-        <p:nvPicPr>
-          <p:cNvPr id="2" name="Picture 2"/>
-          <p:cNvPicPr>
-            <a:picLocks noChangeAspect="1" noChangeArrowheads="1"/>
-          </p:cNvPicPr>
-          <p:nvPr userDrawn="1"/>
-        </p:nvPicPr>
-        <p:blipFill>
-          <a:blip r:embed="rId3">
-            <a:extLst>
-              <a:ext uri="{28A0092B-C50C-407E-A947-70E740481C1C}">
-                <a14:useLocalDpi xmlns:a14="http://schemas.microsoft.com/office/drawing/2010/main" val="0"/>
-              </a:ext>
-            </a:extLst>
-          </a:blip>
-          <a:stretch>
-            <a:fillRect/>
-          </a:stretch>
-        </p:blipFill>
-        <p:spPr bwMode="black">
-          <a:xfrm>
-            <a:off x="4321174" y="3140274"/>
-            <a:ext cx="3546476" cy="577452"/>
-          </a:xfrm>
-          <a:prstGeom prst="rect">
-            <a:avLst/>
-          </a:prstGeom>
-          <a:noFill/>
-          <a:ln>
-            <a:noFill/>
-          </a:ln>
-        </p:spPr>
-      </p:pic>
       <p:sp>
         <p:nvSpPr>
           <p:cNvPr id="3" name="Text Box 3"/>
@@ -4537,6 +4498,36 @@
           </a:p>
         </p:txBody>
       </p:sp>
+      <p:pic>
+        <p:nvPicPr>
+          <p:cNvPr id="4" name="Picture 3"/>
+          <p:cNvPicPr>
+            <a:picLocks noChangeAspect="1"/>
+          </p:cNvPicPr>
+          <p:nvPr userDrawn="1"/>
+        </p:nvPicPr>
+        <p:blipFill>
+          <a:blip r:embed="rId3" cstate="print">
+            <a:extLst>
+              <a:ext uri="{28A0092B-C50C-407E-A947-70E740481C1C}">
+                <a14:useLocalDpi xmlns:a14="http://schemas.microsoft.com/office/drawing/2010/main" val="0"/>
+              </a:ext>
+            </a:extLst>
+          </a:blip>
+          <a:stretch>
+            <a:fillRect/>
+          </a:stretch>
+        </p:blipFill>
+        <p:spPr bwMode="invGray">
+          <a:xfrm>
+            <a:off x="4482902" y="3072036"/>
+            <a:ext cx="3223021" cy="690417"/>
+          </a:xfrm>
+          <a:prstGeom prst="rect">
+            <a:avLst/>
+          </a:prstGeom>
+        </p:spPr>
+      </p:pic>
     </p:spTree>
     <p:extLst>
       <p:ext uri="{BB962C8B-B14F-4D97-AF65-F5344CB8AC3E}">
@@ -11804,23 +11795,6 @@
                 </a:rPr>
               </a:br>
               <a:r>
-                <a:rPr lang="en-US" sz="2600" spc="-100" dirty="0" err="1">
-                  <a:gradFill>
-                    <a:gsLst>
-                      <a:gs pos="0">
-                        <a:srgbClr val="595959"/>
-                      </a:gs>
-                      <a:gs pos="86000">
-                        <a:srgbClr val="595959"/>
-                      </a:gs>
-                    </a:gsLst>
-                    <a:lin ang="5400000" scaled="0"/>
-                  </a:gradFill>
-                  <a:latin typeface="Segoe UI Light" pitchFamily="34" charset="0"/>
-                </a:rPr>
-                <a:t>Hashtag</a:t>
-              </a:r>
-              <a:r>
                 <a:rPr lang="en-US" sz="2600" spc="-100" dirty="0">
                   <a:gradFill>
                     <a:gsLst>
@@ -11835,7 +11809,7 @@
                   </a:gradFill>
                   <a:latin typeface="Segoe UI Light" pitchFamily="34" charset="0"/>
                 </a:rPr>
-                <a:t> </a:t>
+                <a:t>Hashtag </a:t>
               </a:r>
               <a:r>
                 <a:rPr lang="en-US" sz="2600" spc="-100" dirty="0" smtClean="0">
@@ -11855,7 +11829,7 @@
                 <a:t>#</a:t>
               </a:r>
               <a:r>
-                <a:rPr lang="en-US" sz="2600" spc="-100" smtClean="0">
+                <a:rPr lang="en-US" sz="2600" spc="-100" dirty="0" err="1" smtClean="0">
                   <a:gradFill>
                     <a:gsLst>
                       <a:gs pos="0">
@@ -11897,7 +11871,7 @@
                 <a:buSzPct val="80000"/>
               </a:pPr>
               <a:r>
-                <a:rPr lang="en-US" sz="2600" spc="-100" dirty="0">
+                <a:rPr lang="en-US" sz="2600" spc="-100" dirty="0" smtClean="0">
                   <a:gradFill>
                     <a:gsLst>
                       <a:gs pos="0">
@@ -11911,8 +11885,22 @@
                   </a:gradFill>
                   <a:latin typeface="Segoe UI Light" pitchFamily="34" charset="0"/>
                 </a:rPr>
-                <a:t>SPEAKER NAME/HANDLE HERE</a:t>
+                <a:t>[Speaker] / [Twitter]</a:t>
               </a:r>
+              <a:endParaRPr lang="en-US" sz="2600" spc="-100" dirty="0">
+                <a:gradFill>
+                  <a:gsLst>
+                    <a:gs pos="0">
+                      <a:srgbClr val="595959"/>
+                    </a:gs>
+                    <a:gs pos="86000">
+                      <a:srgbClr val="595959"/>
+                    </a:gs>
+                  </a:gsLst>
+                  <a:lin ang="5400000" scaled="0"/>
+                </a:gradFill>
+                <a:latin typeface="Segoe UI Light" pitchFamily="34" charset="0"/>
+              </a:endParaRPr>
             </a:p>
           </p:txBody>
         </p:sp>
@@ -13789,7 +13777,7 @@
           <a:graphicData uri="http://schemas.openxmlformats.org/presentationml/2006/ole">
             <mc:AlternateContent xmlns:mc="http://schemas.openxmlformats.org/markup-compatibility/2006">
               <mc:Choice xmlns:v="urn:schemas-microsoft-com:vml" Requires="v">
-                <p:oleObj spid="_x0000_s58497" name="think-cell Slide" r:id="rId5" imgW="270" imgH="270" progId="TCLayout.ActiveDocument.1">
+                <p:oleObj spid="_x0000_s58498" name="think-cell Slide" r:id="rId5" imgW="270" imgH="270" progId="TCLayout.ActiveDocument.1">
                   <p:embed/>
                 </p:oleObj>
               </mc:Choice>
@@ -13898,7 +13886,7 @@
           <a:graphicData uri="http://schemas.openxmlformats.org/presentationml/2006/ole">
             <mc:AlternateContent xmlns:mc="http://schemas.openxmlformats.org/markup-compatibility/2006">
               <mc:Choice xmlns:v="urn:schemas-microsoft-com:vml" Requires="v">
-                <p:oleObj spid="_x0000_s59516" name="think-cell Slide" r:id="rId4" imgW="270" imgH="270" progId="TCLayout.ActiveDocument.1">
+                <p:oleObj spid="_x0000_s59517" name="think-cell Slide" r:id="rId4" imgW="270" imgH="270" progId="TCLayout.ActiveDocument.1">
                   <p:embed/>
                 </p:oleObj>
               </mc:Choice>
@@ -13971,26 +13959,25 @@
             <p:ph type="body" sz="quarter" idx="11"/>
           </p:nvPr>
         </p:nvSpPr>
-        <p:spPr/>
+        <p:spPr>
+          <a:xfrm>
+            <a:off x="519113" y="5460240"/>
+            <a:ext cx="5454333" cy="738664"/>
+          </a:xfrm>
+        </p:spPr>
         <p:txBody>
           <a:bodyPr/>
           <a:lstStyle/>
           <a:p>
             <a:r>
-              <a:rPr lang="en-US" smtClean="0"/>
-              <a:t>Name</a:t>
-            </a:r>
-          </a:p>
-          <a:p>
-            <a:r>
-              <a:rPr lang="en-US" smtClean="0"/>
-              <a:t>Title</a:t>
-            </a:r>
-          </a:p>
-          <a:p>
-            <a:r>
-              <a:rPr lang="en-US" smtClean="0"/>
-              <a:t>Microsoft Corporation</a:t>
+              <a:rPr lang="en-US" dirty="0" smtClean="0"/>
+              <a:t>[Speaker]</a:t>
+            </a:r>
+          </a:p>
+          <a:p>
+            <a:r>
+              <a:rPr lang="en-US" dirty="0" smtClean="0"/>
+              <a:t>[Company]</a:t>
             </a:r>
             <a:endParaRPr lang="en-US" dirty="0"/>
           </a:p>
@@ -14070,7 +14057,7 @@
           <a:graphicData uri="http://schemas.openxmlformats.org/presentationml/2006/ole">
             <mc:AlternateContent xmlns:mc="http://schemas.openxmlformats.org/markup-compatibility/2006">
               <mc:Choice xmlns:v="urn:schemas-microsoft-com:vml" Requires="v">
-                <p:oleObj spid="_x0000_s23682" name="think-cell Slide" r:id="rId6" imgW="270" imgH="270" progId="TCLayout.ActiveDocument.1">
+                <p:oleObj spid="_x0000_s23683" name="think-cell Slide" r:id="rId6" imgW="270" imgH="270" progId="TCLayout.ActiveDocument.1">
                   <p:embed/>
                 </p:oleObj>
               </mc:Choice>
@@ -20414,15 +20401,6 @@
 </file>
 
 <file path=customXml/item2.xml><?xml version="1.0" encoding="utf-8"?>
-<?mso-contentType ?>
-<FormTemplates xmlns="http://schemas.microsoft.com/sharepoint/v3/contenttype/forms">
-  <Display>DocumentLibraryForm</Display>
-  <Edit>DocumentLibraryForm</Edit>
-  <New>DocumentLibraryForm</New>
-</FormTemplates>
-</file>
-
-<file path=customXml/item3.xml><?xml version="1.0" encoding="utf-8"?>
 <p:properties xmlns:p="http://schemas.microsoft.com/office/2006/metadata/properties" xmlns:xsi="http://www.w3.org/2001/XMLSchema-instance" xmlns:pc="http://schemas.microsoft.com/office/infopath/2007/PartnerControls">
   <documentManagement>
     <TaxKeywordTaxHTField xmlns="230e9df3-be65-4c73-a93b-d1236ebd677e">
@@ -20431,6 +20409,15 @@
     <TaxCatchAll xmlns="230e9df3-be65-4c73-a93b-d1236ebd677e"/>
   </documentManagement>
 </p:properties>
+</file>
+
+<file path=customXml/item3.xml><?xml version="1.0" encoding="utf-8"?>
+<?mso-contentType ?>
+<FormTemplates xmlns="http://schemas.microsoft.com/sharepoint/v3/contenttype/forms">
+  <Display>DocumentLibraryForm</Display>
+  <Edit>DocumentLibraryForm</Edit>
+  <New>DocumentLibraryForm</New>
+</FormTemplates>
 </file>
 
 <file path=customXml/itemProps1.xml><?xml version="1.0" encoding="utf-8"?>
@@ -20452,14 +20439,6 @@
 </file>
 
 <file path=customXml/itemProps2.xml><?xml version="1.0" encoding="utf-8"?>
-<ds:datastoreItem xmlns:ds="http://schemas.openxmlformats.org/officeDocument/2006/customXml" ds:itemID="{B882D8D6-9D38-4159-A398-AAC3689D3D7C}">
-  <ds:schemaRefs>
-    <ds:schemaRef ds:uri="http://schemas.microsoft.com/sharepoint/v3/contenttype/forms"/>
-  </ds:schemaRefs>
-</ds:datastoreItem>
-</file>
-
-<file path=customXml/itemProps3.xml><?xml version="1.0" encoding="utf-8"?>
 <ds:datastoreItem xmlns:ds="http://schemas.openxmlformats.org/officeDocument/2006/customXml" ds:itemID="{69B2F97D-0457-4986-9734-D03EB073C5EA}">
   <ds:schemaRefs>
     <ds:schemaRef ds:uri="http://schemas.microsoft.com/office/infopath/2007/PartnerControls"/>
@@ -20473,4 +20452,12 @@
     <ds:schemaRef ds:uri="http://purl.org/dc/dcmitype/"/>
   </ds:schemaRefs>
 </ds:datastoreItem>
+</file>
+
+<file path=customXml/itemProps3.xml><?xml version="1.0" encoding="utf-8"?>
+<ds:datastoreItem xmlns:ds="http://schemas.openxmlformats.org/officeDocument/2006/customXml" ds:itemID="{B882D8D6-9D38-4159-A398-AAC3689D3D7C}">
+  <ds:schemaRefs>
+    <ds:schemaRef ds:uri="http://schemas.microsoft.com/sharepoint/v3/contenttype/forms"/>
+  </ds:schemaRefs>
+</ds:datastoreItem>
 </file>
</xml_diff>